<commit_message>
Updated Presentation for W10-S2
</commit_message>
<xml_diff>
--- a/week-10/W10-S2-ReactContext/W10-S2-ReactContext.pptx
+++ b/week-10/W10-S2-ReactContext/W10-S2-ReactContext.pptx
@@ -5,10 +5,10 @@
     <p:sldMasterId id="2147483968" r:id="rId1"/>
   </p:sldMasterIdLst>
   <p:notesMasterIdLst>
-    <p:notesMasterId r:id="rId14"/>
+    <p:notesMasterId r:id="rId15"/>
   </p:notesMasterIdLst>
   <p:handoutMasterIdLst>
-    <p:handoutMasterId r:id="rId15"/>
+    <p:handoutMasterId r:id="rId16"/>
   </p:handoutMasterIdLst>
   <p:sldIdLst>
     <p:sldId id="256" r:id="rId2"/>
@@ -22,7 +22,8 @@
     <p:sldId id="288" r:id="rId10"/>
     <p:sldId id="289" r:id="rId11"/>
     <p:sldId id="292" r:id="rId12"/>
-    <p:sldId id="264" r:id="rId13"/>
+    <p:sldId id="297" r:id="rId13"/>
+    <p:sldId id="264" r:id="rId14"/>
   </p:sldIdLst>
   <p:sldSz cx="12192000" cy="6858000"/>
   <p:notesSz cx="6858000" cy="9144000"/>
@@ -137,6 +138,7 @@
             <p14:sldId id="288"/>
             <p14:sldId id="289"/>
             <p14:sldId id="292"/>
+            <p14:sldId id="297"/>
             <p14:sldId id="264"/>
           </p14:sldIdLst>
         </p14:section>
@@ -449,7 +451,7 @@
           <a:p>
             <a:fld id="{AA884A5F-B9F5-9B43-BE5B-EBBCD5646595}" type="datetimeFigureOut">
               <a:rPr lang="en-US" smtClean="0"/>
-              <a:t>11/10/24</a:t>
+              <a:t>11/17/24</a:t>
             </a:fld>
             <a:endParaRPr lang="en-US"/>
           </a:p>
@@ -1370,7 +1372,7 @@
           <a:p>
             <a:fld id="{F6FA2B21-3FCD-4721-B95C-427943F61125}" type="datetime1">
               <a:rPr lang="en-US" smtClean="0"/>
-              <a:t>11/10/24</a:t>
+              <a:t>11/17/24</a:t>
             </a:fld>
             <a:endParaRPr lang="en-US"/>
           </a:p>
@@ -1633,7 +1635,7 @@
           <a:p>
             <a:fld id="{F6FA2B21-3FCD-4721-B95C-427943F61125}" type="datetime1">
               <a:rPr lang="en-US" smtClean="0"/>
-              <a:t>11/10/24</a:t>
+              <a:t>11/17/24</a:t>
             </a:fld>
             <a:endParaRPr lang="en-US"/>
           </a:p>
@@ -1869,7 +1871,7 @@
           <a:p>
             <a:fld id="{F6FA2B21-3FCD-4721-B95C-427943F61125}" type="datetime1">
               <a:rPr lang="en-US" smtClean="0"/>
-              <a:t>11/10/24</a:t>
+              <a:t>11/17/24</a:t>
             </a:fld>
             <a:endParaRPr lang="en-US"/>
           </a:p>
@@ -2197,7 +2199,7 @@
           <a:p>
             <a:fld id="{EA0C0817-A112-4847-8014-A94B7D2A4EA3}" type="datetime1">
               <a:rPr lang="en-US" smtClean="0"/>
-              <a:t>11/10/24</a:t>
+              <a:t>11/17/24</a:t>
             </a:fld>
             <a:endParaRPr lang="en-US" dirty="0"/>
           </a:p>
@@ -2511,7 +2513,7 @@
           <a:p>
             <a:fld id="{7332B432-ACDA-4023-A761-2BAB76577B62}" type="datetime1">
               <a:rPr lang="en-US" smtClean="0"/>
-              <a:t>11/10/24</a:t>
+              <a:t>11/17/24</a:t>
             </a:fld>
             <a:endParaRPr lang="en-US"/>
           </a:p>
@@ -2818,7 +2820,7 @@
           <a:p>
             <a:fld id="{D9C646AA-F36E-4540-911D-FFFC0A0EF24A}" type="datetime1">
               <a:rPr lang="en-US" smtClean="0"/>
-              <a:t>11/10/24</a:t>
+              <a:t>11/17/24</a:t>
             </a:fld>
             <a:endParaRPr lang="en-US" dirty="0"/>
           </a:p>
@@ -3120,7 +3122,7 @@
           <a:p>
             <a:fld id="{69186D26-FA5F-4637-B602-B7C2DC34CFD4}" type="datetime1">
               <a:rPr lang="en-US" smtClean="0"/>
-              <a:t>11/10/24</a:t>
+              <a:t>11/17/24</a:t>
             </a:fld>
             <a:endParaRPr lang="en-US"/>
           </a:p>
@@ -3542,7 +3544,7 @@
           <a:p>
             <a:fld id="{8A7F15D8-96D1-4781-BC50-CA8A088B2FE4}" type="datetime1">
               <a:rPr lang="en-US" smtClean="0"/>
-              <a:t>11/10/24</a:t>
+              <a:t>11/17/24</a:t>
             </a:fld>
             <a:endParaRPr lang="en-US"/>
           </a:p>
@@ -3704,7 +3706,7 @@
           <a:p>
             <a:fld id="{F9A96C99-B8F8-4528-BD05-0E16E943DC09}" type="datetime1">
               <a:rPr lang="en-US" smtClean="0"/>
-              <a:t>11/10/24</a:t>
+              <a:t>11/17/24</a:t>
             </a:fld>
             <a:endParaRPr lang="en-US"/>
           </a:p>
@@ -3799,7 +3801,7 @@
           <a:p>
             <a:fld id="{03636942-C211-4B28-8DBD-C953E00AF71B}" type="datetime1">
               <a:rPr lang="en-US" smtClean="0"/>
-              <a:t>11/10/24</a:t>
+              <a:t>11/17/24</a:t>
             </a:fld>
             <a:endParaRPr lang="en-US"/>
           </a:p>
@@ -4177,7 +4179,7 @@
           <a:p>
             <a:fld id="{7E8D12A6-918A-48BD-8CB9-CA713993B0EA}" type="datetime1">
               <a:rPr lang="en-US" smtClean="0"/>
-              <a:t>11/10/24</a:t>
+              <a:t>11/17/24</a:t>
             </a:fld>
             <a:endParaRPr lang="en-US"/>
           </a:p>
@@ -4466,7 +4468,7 @@
           <a:p>
             <a:fld id="{F6FA2B21-3FCD-4721-B95C-427943F61125}" type="datetime1">
               <a:rPr lang="en-US" smtClean="0"/>
-              <a:t>11/10/24</a:t>
+              <a:t>11/17/24</a:t>
             </a:fld>
             <a:endParaRPr lang="en-US"/>
           </a:p>
@@ -4678,7 +4680,7 @@
           <a:p>
             <a:fld id="{F6FA2B21-3FCD-4721-B95C-427943F61125}" type="datetime1">
               <a:rPr lang="en-US" smtClean="0"/>
-              <a:t>11/10/24</a:t>
+              <a:t>11/17/24</a:t>
             </a:fld>
             <a:endParaRPr lang="en-US"/>
           </a:p>
@@ -5382,7 +5384,7 @@
                   <a:schemeClr val="tx1"/>
                 </a:solidFill>
               </a:rPr>
-              <a:t>Introducing React</a:t>
+              <a:t>Using React Context</a:t>
             </a:r>
             <a:endParaRPr lang="en-US" sz="4000" dirty="0">
               <a:solidFill>
@@ -5498,7 +5500,7 @@
           <a:p>
             <a:r>
               <a:rPr lang="en-GB" dirty="0"/>
-              <a:t>Components and Props</a:t>
+              <a:t>Creating and Using Consumers</a:t>
             </a:r>
           </a:p>
         </p:txBody>
@@ -5533,35 +5535,14 @@
           <a:p>
             <a:r>
               <a:rPr lang="en-GB" b="1" dirty="0"/>
-              <a:t>Components</a:t>
-            </a:r>
-            <a:r>
-              <a:rPr lang="en-GB" dirty="0"/>
-              <a:t>: </a:t>
+              <a:t>What is a Consumer?</a:t>
             </a:r>
             <a:br>
               <a:rPr lang="en-GB" dirty="0"/>
             </a:br>
             <a:r>
               <a:rPr lang="en-GB" dirty="0"/>
-              <a:t>Building blocks of a React app. Can be functional or class-based.</a:t>
-            </a:r>
-          </a:p>
-          <a:p>
-            <a:r>
-              <a:rPr lang="en-GB" b="1" dirty="0"/>
-              <a:t>Props</a:t>
-            </a:r>
-            <a:r>
-              <a:rPr lang="en-GB" dirty="0"/>
-              <a:t>: </a:t>
-            </a:r>
-            <a:br>
-              <a:rPr lang="en-GB" dirty="0"/>
-            </a:br>
-            <a:r>
-              <a:rPr lang="en-GB" dirty="0"/>
-              <a:t>Short for “properties,” used to pass data from one component to another.</a:t>
+              <a:t>A component that subscribes to a Context and receives its value.</a:t>
             </a:r>
           </a:p>
           <a:p>
@@ -5570,15 +5551,33 @@
               <a:buChar char="•"/>
             </a:pPr>
             <a:r>
+              <a:rPr lang="en-GB" dirty="0"/>
+              <a:t>Example with a Consumer:</a:t>
+            </a:r>
+          </a:p>
+          <a:p>
+            <a:r>
               <a:rPr lang="en-GB" b="1" dirty="0"/>
-              <a:t>Usage:</a:t>
-            </a:r>
-            <a:br>
+              <a:t>When to Use Consumers Over </a:t>
+            </a:r>
+            <a:r>
+              <a:rPr lang="en-GB" b="1" dirty="0" err="1"/>
+              <a:t>useContext</a:t>
+            </a:r>
+            <a:r>
               <a:rPr lang="en-GB" b="1" dirty="0"/>
-            </a:br>
+              <a:t>:</a:t>
+            </a:r>
+            <a:endParaRPr lang="en-GB" dirty="0"/>
+          </a:p>
+          <a:p>
+            <a:pPr marL="742950" lvl="1" indent="-285750">
+              <a:buFont typeface="Arial" panose="020B0604020202020204" pitchFamily="34" charset="0"/>
+              <a:buChar char="•"/>
+            </a:pPr>
             <a:r>
               <a:rPr lang="en-GB" dirty="0"/>
-              <a:t>Here, name="Alice" is a prop passed to the Greeting component.</a:t>
+              <a:t>When working with class components.</a:t>
             </a:r>
           </a:p>
           <a:p>
@@ -5588,10 +5587,10 @@
       </p:sp>
       <p:pic>
         <p:nvPicPr>
-          <p:cNvPr id="6" name="Picture 5" descr="A black background with white text&#10;&#10;Description automatically generated">
+          <p:cNvPr id="5" name="Picture 4" descr="A black background with white text&#10;&#10;Description automatically generated">
             <a:extLst>
               <a:ext uri="{FF2B5EF4-FFF2-40B4-BE49-F238E27FC236}">
-                <a16:creationId xmlns:a16="http://schemas.microsoft.com/office/drawing/2014/main" id="{A6AC0DD5-4035-2DEB-8534-B8920E5FBAE5}"/>
+                <a16:creationId xmlns:a16="http://schemas.microsoft.com/office/drawing/2014/main" id="{1AC8A0DC-161A-9433-1199-45ADF9C023EC}"/>
               </a:ext>
             </a:extLst>
           </p:cNvPr>
@@ -5608,38 +5607,8 @@
         </p:blipFill>
         <p:spPr>
           <a:xfrm>
-            <a:off x="6702991" y="2557745"/>
-            <a:ext cx="4648200" cy="1104900"/>
-          </a:xfrm>
-          <a:prstGeom prst="rect">
-            <a:avLst/>
-          </a:prstGeom>
-        </p:spPr>
-      </p:pic>
-      <p:pic>
-        <p:nvPicPr>
-          <p:cNvPr id="8" name="Picture 7">
-            <a:extLst>
-              <a:ext uri="{FF2B5EF4-FFF2-40B4-BE49-F238E27FC236}">
-                <a16:creationId xmlns:a16="http://schemas.microsoft.com/office/drawing/2014/main" id="{955D2B41-8BB4-8993-DDBE-71B3A187198C}"/>
-              </a:ext>
-            </a:extLst>
-          </p:cNvPr>
-          <p:cNvPicPr>
-            <a:picLocks noChangeAspect="1"/>
-          </p:cNvPicPr>
-          <p:nvPr/>
-        </p:nvPicPr>
-        <p:blipFill>
-          <a:blip r:embed="rId3"/>
-          <a:stretch>
-            <a:fillRect/>
-          </a:stretch>
-        </p:blipFill>
-        <p:spPr>
-          <a:xfrm>
-            <a:off x="6702991" y="4502401"/>
-            <a:ext cx="3251200" cy="596900"/>
+            <a:off x="6499992" y="3205294"/>
+            <a:ext cx="4939672" cy="1487213"/>
           </a:xfrm>
           <a:prstGeom prst="rect">
             <a:avLst/>
@@ -5746,78 +5715,20 @@
           <a:lstStyle/>
           <a:p>
             <a:r>
-              <a:rPr lang="en-GB" b="1" dirty="0"/>
-              <a:t>React</a:t>
-            </a:r>
-            <a:r>
               <a:rPr lang="en-GB" dirty="0"/>
-              <a:t>: </a:t>
-            </a:r>
-            <a:br>
+              <a:t>React Context simplifies state management.</a:t>
+            </a:r>
+          </a:p>
+          <a:p>
+            <a:r>
               <a:rPr lang="en-GB" dirty="0"/>
-            </a:br>
+              <a:t>Avoids prop drilling for better readability.</a:t>
+            </a:r>
+          </a:p>
+          <a:p>
             <a:r>
               <a:rPr lang="en-GB" dirty="0"/>
-              <a:t>A powerful library for building user interfaces.</a:t>
-            </a:r>
-          </a:p>
-          <a:p>
-            <a:r>
-              <a:rPr lang="en-GB" b="1" dirty="0"/>
-              <a:t>Benefits</a:t>
-            </a:r>
-            <a:r>
-              <a:rPr lang="en-GB" dirty="0"/>
-              <a:t>: </a:t>
-            </a:r>
-            <a:br>
-              <a:rPr lang="en-GB" dirty="0"/>
-            </a:br>
-            <a:r>
-              <a:rPr lang="en-GB" dirty="0"/>
-              <a:t>Reusable components, fast rendering with Virtual DOM, and declarative programming.</a:t>
-            </a:r>
-          </a:p>
-          <a:p>
-            <a:r>
-              <a:rPr lang="en-GB" b="1" dirty="0"/>
-              <a:t>Development Tools</a:t>
-            </a:r>
-            <a:r>
-              <a:rPr lang="en-GB" dirty="0"/>
-              <a:t>: </a:t>
-            </a:r>
-            <a:br>
-              <a:rPr lang="en-GB" dirty="0"/>
-            </a:br>
-            <a:r>
-              <a:rPr lang="en-GB" dirty="0"/>
-              <a:t>Use </a:t>
-            </a:r>
-            <a:r>
-              <a:rPr lang="en-GB" dirty="0" err="1"/>
-              <a:t>Vite</a:t>
-            </a:r>
-            <a:r>
-              <a:rPr lang="en-GB" dirty="0"/>
-              <a:t> for faster development and modern features.</a:t>
-            </a:r>
-          </a:p>
-          <a:p>
-            <a:r>
-              <a:rPr lang="en-GB" b="1" dirty="0"/>
-              <a:t>Core Concepts</a:t>
-            </a:r>
-            <a:r>
-              <a:rPr lang="en-GB" dirty="0"/>
-              <a:t>: </a:t>
-            </a:r>
-            <a:br>
-              <a:rPr lang="en-GB" dirty="0"/>
-            </a:br>
-            <a:r>
-              <a:rPr lang="en-GB" dirty="0"/>
-              <a:t>JSX, components, and props are the foundational elements of React.</a:t>
+              <a:t>Scales well with multiple contexts for modular state handling.</a:t>
             </a:r>
           </a:p>
         </p:txBody>
@@ -5836,6 +5747,138 @@
 </file>
 
 <file path=ppt/slides/slide12.xml><?xml version="1.0" encoding="utf-8"?>
+<p:sld xmlns:a="http://schemas.openxmlformats.org/drawingml/2006/main" xmlns:r="http://schemas.openxmlformats.org/officeDocument/2006/relationships" xmlns:p="http://schemas.openxmlformats.org/presentationml/2006/main">
+  <p:cSld>
+    <p:spTree>
+      <p:nvGrpSpPr>
+        <p:cNvPr id="1" name="">
+          <a:extLst>
+            <a:ext uri="{FF2B5EF4-FFF2-40B4-BE49-F238E27FC236}">
+              <a16:creationId xmlns:a16="http://schemas.microsoft.com/office/drawing/2014/main" id="{32B5B5F6-E8AE-6D31-B183-E8913D9D83E6}"/>
+            </a:ext>
+          </a:extLst>
+        </p:cNvPr>
+        <p:cNvGrpSpPr/>
+        <p:nvPr/>
+      </p:nvGrpSpPr>
+      <p:grpSpPr>
+        <a:xfrm>
+          <a:off x="0" y="0"/>
+          <a:ext cx="0" cy="0"/>
+          <a:chOff x="0" y="0"/>
+          <a:chExt cx="0" cy="0"/>
+        </a:xfrm>
+      </p:grpSpPr>
+      <p:sp>
+        <p:nvSpPr>
+          <p:cNvPr id="2" name="Title 1">
+            <a:extLst>
+              <a:ext uri="{FF2B5EF4-FFF2-40B4-BE49-F238E27FC236}">
+                <a16:creationId xmlns:a16="http://schemas.microsoft.com/office/drawing/2014/main" id="{0D767EFF-18C8-31E4-4FF5-18690B738B2C}"/>
+              </a:ext>
+            </a:extLst>
+          </p:cNvPr>
+          <p:cNvSpPr>
+            <a:spLocks noGrp="1"/>
+          </p:cNvSpPr>
+          <p:nvPr>
+            <p:ph type="title"/>
+          </p:nvPr>
+        </p:nvSpPr>
+        <p:spPr>
+          <a:xfrm>
+            <a:off x="581193" y="729658"/>
+            <a:ext cx="11029616" cy="988332"/>
+          </a:xfrm>
+        </p:spPr>
+        <p:txBody>
+          <a:bodyPr anchor="b">
+            <a:normAutofit/>
+          </a:bodyPr>
+          <a:lstStyle/>
+          <a:p>
+            <a:r>
+              <a:rPr lang="en-GB" dirty="0"/>
+              <a:t>Next Steps</a:t>
+            </a:r>
+          </a:p>
+        </p:txBody>
+      </p:sp>
+      <p:sp>
+        <p:nvSpPr>
+          <p:cNvPr id="3" name="Content Placeholder 2">
+            <a:extLst>
+              <a:ext uri="{FF2B5EF4-FFF2-40B4-BE49-F238E27FC236}">
+                <a16:creationId xmlns:a16="http://schemas.microsoft.com/office/drawing/2014/main" id="{CB0A3D22-CE26-D671-47DA-4D7342FAFE94}"/>
+              </a:ext>
+            </a:extLst>
+          </p:cNvPr>
+          <p:cNvSpPr>
+            <a:spLocks noGrp="1"/>
+          </p:cNvSpPr>
+          <p:nvPr>
+            <p:ph sz="half" idx="1"/>
+          </p:nvPr>
+        </p:nvSpPr>
+        <p:spPr>
+          <a:xfrm>
+            <a:off x="581192" y="2110773"/>
+            <a:ext cx="5198285" cy="3633047"/>
+          </a:xfrm>
+        </p:spPr>
+        <p:txBody>
+          <a:bodyPr anchor="ctr">
+            <a:normAutofit/>
+          </a:bodyPr>
+          <a:lstStyle/>
+          <a:p>
+            <a:r>
+              <a:rPr lang="en-GB" dirty="0"/>
+              <a:t>Experiment with custom hooks for </a:t>
+            </a:r>
+            <a:r>
+              <a:rPr lang="en-GB" err="1"/>
+              <a:t>context</a:t>
+            </a:r>
+            <a:r>
+              <a:rPr lang="en-GB"/>
+              <a:t>.</a:t>
+            </a:r>
+          </a:p>
+          <a:p>
+            <a:r>
+              <a:rPr lang="en-GB"/>
+              <a:t>Combine </a:t>
+            </a:r>
+            <a:r>
+              <a:rPr lang="en-GB" dirty="0"/>
+              <a:t>with state libraries like Redux or </a:t>
+            </a:r>
+            <a:r>
+              <a:rPr lang="en-GB" dirty="0" err="1"/>
+              <a:t>Zustand</a:t>
+            </a:r>
+            <a:r>
+              <a:rPr lang="en-GB" dirty="0"/>
+              <a:t> for larger apps.</a:t>
+            </a:r>
+          </a:p>
+        </p:txBody>
+      </p:sp>
+    </p:spTree>
+    <p:extLst>
+      <p:ext uri="{BB962C8B-B14F-4D97-AF65-F5344CB8AC3E}">
+        <p14:creationId xmlns:p14="http://schemas.microsoft.com/office/powerpoint/2010/main" val="1033557322"/>
+      </p:ext>
+    </p:extLst>
+  </p:cSld>
+  <p:clrMapOvr>
+    <a:masterClrMapping/>
+  </p:clrMapOvr>
+</p:sld>
+</file>
+
+<file path=ppt/slides/slide13.xml><?xml version="1.0" encoding="utf-8"?>
 <p:sld xmlns:a="http://schemas.openxmlformats.org/drawingml/2006/main" xmlns:r="http://schemas.openxmlformats.org/officeDocument/2006/relationships" xmlns:p="http://schemas.openxmlformats.org/presentationml/2006/main">
   <p:cSld>
     <p:spTree>
@@ -5952,7 +5995,7 @@
           <a:p>
             <a:r>
               <a:rPr lang="en-GB" dirty="0"/>
-              <a:t>An Introduction to Building User Interfaces with React</a:t>
+              <a:t>Simplifying State Management in React</a:t>
             </a:r>
           </a:p>
         </p:txBody>
@@ -6007,7 +6050,7 @@
             </a:pPr>
             <a:r>
               <a:rPr lang="en-GB" dirty="0"/>
-              <a:t>The history of React</a:t>
+              <a:t>What is React Context</a:t>
             </a:r>
           </a:p>
           <a:p>
@@ -6017,7 +6060,7 @@
             </a:pPr>
             <a:r>
               <a:rPr lang="en-GB" dirty="0"/>
-              <a:t>Installation</a:t>
+              <a:t>Real World examples</a:t>
             </a:r>
           </a:p>
           <a:p>
@@ -6027,7 +6070,7 @@
             </a:pPr>
             <a:r>
               <a:rPr lang="en-GB" dirty="0"/>
-              <a:t>JSX Expressions</a:t>
+              <a:t>Context Providers</a:t>
             </a:r>
           </a:p>
           <a:p>
@@ -6037,7 +6080,7 @@
             </a:pPr>
             <a:r>
               <a:rPr lang="en-GB" dirty="0"/>
-              <a:t>Components and Props</a:t>
+              <a:t>Context Consumers</a:t>
             </a:r>
           </a:p>
         </p:txBody>
@@ -6102,7 +6145,7 @@
           <a:p>
             <a:r>
               <a:rPr lang="en-GB" dirty="0"/>
-              <a:t>Who Developed React? A Brief History</a:t>
+              <a:t>Introduction to React Context</a:t>
             </a:r>
           </a:p>
         </p:txBody>
@@ -6125,7 +6168,7 @@
         </p:nvSpPr>
         <p:spPr>
           <a:xfrm>
-            <a:off x="581193" y="2228003"/>
+            <a:off x="581193" y="2354127"/>
             <a:ext cx="5422390" cy="3633047"/>
           </a:xfrm>
         </p:spPr>
@@ -6137,116 +6180,52 @@
           <a:p>
             <a:r>
               <a:rPr lang="en-GB" b="1" dirty="0"/>
-              <a:t>Created by</a:t>
-            </a:r>
-            <a:r>
-              <a:rPr lang="en-GB" dirty="0"/>
-              <a:t>: </a:t>
+              <a:t>What is React Context?</a:t>
             </a:r>
             <a:br>
               <a:rPr lang="en-GB" dirty="0"/>
             </a:br>
             <a:r>
               <a:rPr lang="en-GB" dirty="0"/>
-              <a:t>Facebook (now Meta) in 2011 for internal use.</a:t>
+              <a:t>A mechanism for sharing values across the component tree without passing props manually at every level.</a:t>
             </a:r>
           </a:p>
           <a:p>
             <a:r>
               <a:rPr lang="en-GB" b="1" dirty="0"/>
-              <a:t>Open-Sourced</a:t>
-            </a:r>
+              <a:t>Core Features:</a:t>
+            </a:r>
+            <a:endParaRPr lang="en-GB" dirty="0"/>
+          </a:p>
+          <a:p>
+            <a:pPr>
+              <a:buFont typeface="Arial" panose="020B0604020202020204" pitchFamily="34" charset="0"/>
+              <a:buChar char="•"/>
+            </a:pPr>
             <a:r>
               <a:rPr lang="en-GB" dirty="0"/>
-              <a:t>: </a:t>
-            </a:r>
-            <a:br>
+              <a:t>Provides a global state that can be accessed by any component.</a:t>
+            </a:r>
+          </a:p>
+          <a:p>
+            <a:pPr>
+              <a:buFont typeface="Arial" panose="020B0604020202020204" pitchFamily="34" charset="0"/>
+              <a:buChar char="•"/>
+            </a:pPr>
+            <a:r>
               <a:rPr lang="en-GB" dirty="0"/>
-            </a:br>
-            <a:r>
-              <a:rPr lang="en-GB" dirty="0"/>
-              <a:t>Released to the public in 2013.</a:t>
+              <a:t>Reduces prop drilling.</a:t>
             </a:r>
           </a:p>
           <a:p>
             <a:r>
               <a:rPr lang="en-GB" b="1" dirty="0"/>
-              <a:t>Widespread Use</a:t>
-            </a:r>
-            <a:r>
-              <a:rPr lang="en-GB" dirty="0"/>
-              <a:t>: </a:t>
-            </a:r>
-            <a:br>
-              <a:rPr lang="en-GB" dirty="0"/>
-            </a:br>
-            <a:r>
-              <a:rPr lang="en-GB" dirty="0"/>
-              <a:t>Adopted by many companies worldwide due to its efficiency and flexibility.</a:t>
-            </a:r>
-          </a:p>
-        </p:txBody>
-      </p:sp>
-      <p:pic>
-        <p:nvPicPr>
-          <p:cNvPr id="5" name="Picture 4">
-            <a:extLst>
-              <a:ext uri="{FF2B5EF4-FFF2-40B4-BE49-F238E27FC236}">
-                <a16:creationId xmlns:a16="http://schemas.microsoft.com/office/drawing/2014/main" id="{19C6FC25-64E6-B86B-3F90-33AFF7222067}"/>
-              </a:ext>
-            </a:extLst>
-          </p:cNvPr>
-          <p:cNvPicPr>
-            <a:picLocks noChangeAspect="1"/>
-          </p:cNvPicPr>
-          <p:nvPr/>
-        </p:nvPicPr>
-        <p:blipFill>
-          <a:blip r:embed="rId3"/>
-          <a:stretch>
-            <a:fillRect/>
-          </a:stretch>
-        </p:blipFill>
-        <p:spPr>
-          <a:xfrm>
-            <a:off x="8004007" y="4044526"/>
-            <a:ext cx="3606800" cy="2247900"/>
-          </a:xfrm>
-          <a:prstGeom prst="rect">
-            <a:avLst/>
-          </a:prstGeom>
-        </p:spPr>
-      </p:pic>
-      <p:pic>
-        <p:nvPicPr>
-          <p:cNvPr id="6" name="Picture 5">
-            <a:extLst>
-              <a:ext uri="{FF2B5EF4-FFF2-40B4-BE49-F238E27FC236}">
-                <a16:creationId xmlns:a16="http://schemas.microsoft.com/office/drawing/2014/main" id="{9601E492-BF52-083A-EB02-AAC4595C1EB2}"/>
-              </a:ext>
-            </a:extLst>
-          </p:cNvPr>
-          <p:cNvPicPr>
-            <a:picLocks noChangeAspect="1"/>
-          </p:cNvPicPr>
-          <p:nvPr/>
-        </p:nvPicPr>
-        <p:blipFill>
-          <a:blip r:embed="rId4"/>
-          <a:stretch>
-            <a:fillRect/>
-          </a:stretch>
-        </p:blipFill>
-        <p:spPr>
-          <a:xfrm>
-            <a:off x="6188419" y="2449235"/>
-            <a:ext cx="2259553" cy="1959529"/>
-          </a:xfrm>
-          <a:prstGeom prst="rect">
-            <a:avLst/>
-          </a:prstGeom>
-        </p:spPr>
-      </p:pic>
+              <a:t>Introduced in React 16.3 and improved over time.</a:t>
+            </a:r>
+            <a:endParaRPr lang="en-GB" dirty="0"/>
+          </a:p>
+        </p:txBody>
+      </p:sp>
     </p:spTree>
     <p:extLst>
       <p:ext uri="{BB962C8B-B14F-4D97-AF65-F5344CB8AC3E}">
@@ -6313,7 +6292,7 @@
           <a:p>
             <a:r>
               <a:rPr lang="en-GB" dirty="0"/>
-              <a:t>What Problems Does React Solve?</a:t>
+              <a:t>Installation</a:t>
             </a:r>
           </a:p>
         </p:txBody>
@@ -6348,73 +6327,108 @@
           <a:p>
             <a:r>
               <a:rPr lang="en-GB" b="1" dirty="0"/>
-              <a:t>Component Reusability</a:t>
-            </a:r>
-            <a:r>
-              <a:rPr lang="en-GB" dirty="0"/>
-              <a:t>: </a:t>
+              <a:t>React Context is built into React</a:t>
             </a:r>
             <a:br>
               <a:rPr lang="en-GB" dirty="0"/>
             </a:br>
             <a:r>
               <a:rPr lang="en-GB" dirty="0"/>
-              <a:t>Build reusable components to reduce redundancy and improve maintenance.</a:t>
-            </a:r>
-          </a:p>
-          <a:p>
-            <a:r>
-              <a:rPr lang="en-GB" b="1" dirty="0"/>
-              <a:t>Efficient DOM Manipulation</a:t>
-            </a:r>
-            <a:r>
-              <a:rPr lang="en-GB" dirty="0"/>
-              <a:t>: </a:t>
+              <a:t>no additional library is required.</a:t>
             </a:r>
             <a:br>
               <a:rPr lang="en-GB" dirty="0"/>
             </a:br>
-            <a:r>
-              <a:rPr lang="en-GB" dirty="0"/>
-              <a:t>Uses a virtual DOM to optimize UI updates.</a:t>
-            </a:r>
-          </a:p>
-          <a:p>
-            <a:r>
-              <a:rPr lang="en-GB" b="1" dirty="0"/>
-              <a:t>Declarative Syntax</a:t>
-            </a:r>
-            <a:r>
-              <a:rPr lang="en-GB" dirty="0"/>
-              <a:t>: </a:t>
-            </a:r>
             <a:br>
               <a:rPr lang="en-GB" dirty="0"/>
             </a:br>
             <a:r>
               <a:rPr lang="en-GB" dirty="0"/>
-              <a:t>Simplifies the process of managing UI states across complex applications.</a:t>
-            </a:r>
-          </a:p>
-          <a:p>
-            <a:r>
-              <a:rPr lang="en-GB" b="1" dirty="0"/>
-              <a:t>Component-Based Architecture</a:t>
-            </a:r>
-            <a:r>
-              <a:rPr lang="en-GB" dirty="0"/>
-              <a:t>: </a:t>
-            </a:r>
+              <a:t>1: Import </a:t>
+            </a:r>
+            <a:r>
+              <a:rPr lang="en-GB" dirty="0" err="1"/>
+              <a:t>createContext</a:t>
+            </a:r>
+            <a:endParaRPr lang="en-GB" dirty="0"/>
+          </a:p>
+          <a:p>
+            <a:pPr marL="324000" lvl="1" indent="0">
+              <a:buNone/>
+            </a:pPr>
             <a:br>
               <a:rPr lang="en-GB" dirty="0"/>
             </a:br>
-            <a:r>
+            <a:br>
               <a:rPr lang="en-GB" dirty="0"/>
-              <a:t>Allows developers to build complex UIs by combining simple components.</a:t>
-            </a:r>
-          </a:p>
-        </p:txBody>
-      </p:sp>
+            </a:br>
+            <a:r>
+              <a:rPr lang="en-GB" dirty="0"/>
+              <a:t>2: Create a Context object</a:t>
+            </a:r>
+          </a:p>
+        </p:txBody>
+      </p:sp>
+      <p:pic>
+        <p:nvPicPr>
+          <p:cNvPr id="5" name="Picture 4">
+            <a:extLst>
+              <a:ext uri="{FF2B5EF4-FFF2-40B4-BE49-F238E27FC236}">
+                <a16:creationId xmlns:a16="http://schemas.microsoft.com/office/drawing/2014/main" id="{DA2501B4-2E6B-32F5-5FF5-079C6B86637D}"/>
+              </a:ext>
+            </a:extLst>
+          </p:cNvPr>
+          <p:cNvPicPr>
+            <a:picLocks noChangeAspect="1"/>
+          </p:cNvPicPr>
+          <p:nvPr/>
+        </p:nvPicPr>
+        <p:blipFill>
+          <a:blip r:embed="rId3"/>
+          <a:stretch>
+            <a:fillRect/>
+          </a:stretch>
+        </p:blipFill>
+        <p:spPr>
+          <a:xfrm>
+            <a:off x="5913163" y="3739726"/>
+            <a:ext cx="5473700" cy="609600"/>
+          </a:xfrm>
+          <a:prstGeom prst="rect">
+            <a:avLst/>
+          </a:prstGeom>
+        </p:spPr>
+      </p:pic>
+      <p:pic>
+        <p:nvPicPr>
+          <p:cNvPr id="7" name="Picture 6">
+            <a:extLst>
+              <a:ext uri="{FF2B5EF4-FFF2-40B4-BE49-F238E27FC236}">
+                <a16:creationId xmlns:a16="http://schemas.microsoft.com/office/drawing/2014/main" id="{2154AC04-B8DA-5465-13AE-246BB7ECD180}"/>
+              </a:ext>
+            </a:extLst>
+          </p:cNvPr>
+          <p:cNvPicPr>
+            <a:picLocks noChangeAspect="1"/>
+          </p:cNvPicPr>
+          <p:nvPr/>
+        </p:nvPicPr>
+        <p:blipFill>
+          <a:blip r:embed="rId4"/>
+          <a:stretch>
+            <a:fillRect/>
+          </a:stretch>
+        </p:blipFill>
+        <p:spPr>
+          <a:xfrm>
+            <a:off x="7348263" y="4647988"/>
+            <a:ext cx="4038600" cy="609600"/>
+          </a:xfrm>
+          <a:prstGeom prst="rect">
+            <a:avLst/>
+          </a:prstGeom>
+        </p:spPr>
+      </p:pic>
     </p:spTree>
     <p:extLst>
       <p:ext uri="{BB962C8B-B14F-4D97-AF65-F5344CB8AC3E}">
@@ -6481,7 +6495,7 @@
           <a:p>
             <a:r>
               <a:rPr lang="en-GB" dirty="0"/>
-              <a:t>Real-World Use Cases</a:t>
+              <a:t>What Problem Does React Context Solve?</a:t>
             </a:r>
           </a:p>
         </p:txBody>
@@ -6516,42 +6530,169 @@
           <a:p>
             <a:r>
               <a:rPr lang="en-GB" b="1" dirty="0"/>
-              <a:t>Social Media</a:t>
-            </a:r>
-            <a:r>
-              <a:rPr lang="en-GB" dirty="0"/>
-              <a:t>: </a:t>
-            </a:r>
-            <a:br>
-              <a:rPr lang="en-GB" dirty="0"/>
-            </a:br>
-            <a:r>
-              <a:rPr lang="en-GB" dirty="0"/>
-              <a:t>Facebook and Instagram use React for real-time updates.</a:t>
-            </a:r>
+              <a:t>The Problem:</a:t>
+            </a:r>
+            <a:endParaRPr lang="en-GB" dirty="0"/>
           </a:p>
           <a:p>
             <a:pPr>
               <a:buFont typeface="Arial" panose="020B0604020202020204" pitchFamily="34" charset="0"/>
               <a:buChar char="•"/>
             </a:pPr>
+            <a:r>
+              <a:rPr lang="en-GB" dirty="0"/>
+              <a:t>Prop drilling makes passing data cumbersome and error-prone, especially with deeply nested components.</a:t>
+            </a:r>
+          </a:p>
+          <a:p>
+            <a:r>
+              <a:rPr lang="en-GB" b="1" dirty="0"/>
+              <a:t>The Solution:</a:t>
+            </a:r>
             <a:endParaRPr lang="en-GB" dirty="0"/>
           </a:p>
           <a:p>
+            <a:pPr>
+              <a:buFont typeface="Arial" panose="020B0604020202020204" pitchFamily="34" charset="0"/>
+              <a:buChar char="•"/>
+            </a:pPr>
+            <a:r>
+              <a:rPr lang="en-GB" dirty="0"/>
+              <a:t>React Context allows data to be available anywhere in the component tree without manual prop passing.</a:t>
+            </a:r>
+          </a:p>
+        </p:txBody>
+      </p:sp>
+    </p:spTree>
+    <p:extLst>
+      <p:ext uri="{BB962C8B-B14F-4D97-AF65-F5344CB8AC3E}">
+        <p14:creationId xmlns:p14="http://schemas.microsoft.com/office/powerpoint/2010/main" val="801162467"/>
+      </p:ext>
+    </p:extLst>
+  </p:cSld>
+  <p:clrMapOvr>
+    <a:masterClrMapping/>
+  </p:clrMapOvr>
+</p:sld>
+</file>
+
+<file path=ppt/slides/slide6.xml><?xml version="1.0" encoding="utf-8"?>
+<p:sld xmlns:a="http://schemas.openxmlformats.org/drawingml/2006/main" xmlns:r="http://schemas.openxmlformats.org/officeDocument/2006/relationships" xmlns:p="http://schemas.openxmlformats.org/presentationml/2006/main">
+  <p:cSld>
+    <p:spTree>
+      <p:nvGrpSpPr>
+        <p:cNvPr id="1" name="">
+          <a:extLst>
+            <a:ext uri="{FF2B5EF4-FFF2-40B4-BE49-F238E27FC236}">
+              <a16:creationId xmlns:a16="http://schemas.microsoft.com/office/drawing/2014/main" id="{E083A2D5-79EF-6C4B-982A-B0D8EF3227C4}"/>
+            </a:ext>
+          </a:extLst>
+        </p:cNvPr>
+        <p:cNvGrpSpPr/>
+        <p:nvPr/>
+      </p:nvGrpSpPr>
+      <p:grpSpPr>
+        <a:xfrm>
+          <a:off x="0" y="0"/>
+          <a:ext cx="0" cy="0"/>
+          <a:chOff x="0" y="0"/>
+          <a:chExt cx="0" cy="0"/>
+        </a:xfrm>
+      </p:grpSpPr>
+      <p:sp>
+        <p:nvSpPr>
+          <p:cNvPr id="2" name="Title 1">
+            <a:extLst>
+              <a:ext uri="{FF2B5EF4-FFF2-40B4-BE49-F238E27FC236}">
+                <a16:creationId xmlns:a16="http://schemas.microsoft.com/office/drawing/2014/main" id="{FD5CCBB0-58ED-9772-C2E0-855EA4A029D9}"/>
+              </a:ext>
+            </a:extLst>
+          </p:cNvPr>
+          <p:cNvSpPr>
+            <a:spLocks noGrp="1"/>
+          </p:cNvSpPr>
+          <p:nvPr>
+            <p:ph type="title"/>
+          </p:nvPr>
+        </p:nvSpPr>
+        <p:spPr>
+          <a:xfrm>
+            <a:off x="581193" y="729658"/>
+            <a:ext cx="11029616" cy="988332"/>
+          </a:xfrm>
+        </p:spPr>
+        <p:txBody>
+          <a:bodyPr anchor="b">
+            <a:normAutofit/>
+          </a:bodyPr>
+          <a:lstStyle/>
+          <a:p>
+            <a:r>
+              <a:rPr lang="en-GB" dirty="0"/>
+              <a:t>Real-World Use Cases</a:t>
+            </a:r>
+          </a:p>
+        </p:txBody>
+      </p:sp>
+      <p:sp>
+        <p:nvSpPr>
+          <p:cNvPr id="3" name="Content Placeholder 2">
+            <a:extLst>
+              <a:ext uri="{FF2B5EF4-FFF2-40B4-BE49-F238E27FC236}">
+                <a16:creationId xmlns:a16="http://schemas.microsoft.com/office/drawing/2014/main" id="{8B328E33-DB28-2F65-94EE-1FCCDFB3B59D}"/>
+              </a:ext>
+            </a:extLst>
+          </p:cNvPr>
+          <p:cNvSpPr>
+            <a:spLocks noGrp="1"/>
+          </p:cNvSpPr>
+          <p:nvPr>
+            <p:ph sz="half" idx="1"/>
+          </p:nvPr>
+        </p:nvSpPr>
+        <p:spPr>
+          <a:xfrm>
+            <a:off x="581193" y="2190326"/>
+            <a:ext cx="5422390" cy="3633047"/>
+          </a:xfrm>
+        </p:spPr>
+        <p:txBody>
+          <a:bodyPr anchor="ctr">
+            <a:normAutofit/>
+          </a:bodyPr>
+          <a:lstStyle/>
+          <a:p>
+            <a:pPr>
+              <a:buFont typeface="Arial" panose="020B0604020202020204" pitchFamily="34" charset="0"/>
+              <a:buChar char="•"/>
+            </a:pPr>
             <a:r>
               <a:rPr lang="en-GB" b="1" dirty="0"/>
-              <a:t>E-commerce</a:t>
-            </a:r>
-            <a:r>
-              <a:rPr lang="en-GB" dirty="0"/>
-              <a:t>: </a:t>
+              <a:t>Theme Management:</a:t>
             </a:r>
             <a:br>
               <a:rPr lang="en-GB" dirty="0"/>
             </a:br>
             <a:r>
               <a:rPr lang="en-GB" dirty="0"/>
-              <a:t>Sites like Amazon and Shopify for a dynamic, responsive user experience.</a:t>
+              <a:t>Dynamically switch between light and dark themes.</a:t>
+            </a:r>
+          </a:p>
+          <a:p>
+            <a:pPr>
+              <a:buFont typeface="Arial" panose="020B0604020202020204" pitchFamily="34" charset="0"/>
+              <a:buChar char="•"/>
+            </a:pPr>
+            <a:r>
+              <a:rPr lang="en-GB" b="1" dirty="0"/>
+              <a:t>User Authentication:</a:t>
+            </a:r>
+            <a:br>
+              <a:rPr lang="en-GB" dirty="0"/>
+            </a:br>
+            <a:r>
+              <a:rPr lang="en-GB" dirty="0"/>
+              <a:t>Share user details and authentication status across the app.</a:t>
             </a:r>
           </a:p>
         </p:txBody>
@@ -6561,7 +6702,7 @@
           <p:cNvPr id="4" name="Content Placeholder 2">
             <a:extLst>
               <a:ext uri="{FF2B5EF4-FFF2-40B4-BE49-F238E27FC236}">
-                <a16:creationId xmlns:a16="http://schemas.microsoft.com/office/drawing/2014/main" id="{EBC2D2F4-82A7-9F9C-AE8D-5394A4B9D295}"/>
+                <a16:creationId xmlns:a16="http://schemas.microsoft.com/office/drawing/2014/main" id="{46B2BAF1-04E0-9724-3D0F-94BB4E898FA6}"/>
               </a:ext>
             </a:extLst>
           </p:cNvPr>
@@ -6572,7 +6713,7 @@
         </p:nvSpPr>
         <p:spPr>
           <a:xfrm>
-            <a:off x="5842922" y="2363256"/>
+            <a:off x="5503556" y="2190326"/>
             <a:ext cx="5422390" cy="3633047"/>
           </a:xfrm>
           <a:prstGeom prst="rect">
@@ -6784,20 +6925,20 @@
             </a:lvl9pPr>
           </a:lstStyle>
           <a:p>
+            <a:pPr>
+              <a:buFont typeface="Arial" panose="020B0604020202020204" pitchFamily="34" charset="0"/>
+              <a:buChar char="•"/>
+            </a:pPr>
             <a:r>
               <a:rPr lang="en-GB" b="1" dirty="0"/>
-              <a:t>Media and Streaming</a:t>
-            </a:r>
-            <a:r>
-              <a:rPr lang="en-GB" dirty="0"/>
-              <a:t>: </a:t>
+              <a:t>Language Translation:</a:t>
             </a:r>
             <a:br>
               <a:rPr lang="en-GB" dirty="0"/>
             </a:br>
             <a:r>
               <a:rPr lang="en-GB" dirty="0"/>
-              <a:t>Netflix, Airbnb, and other platforms use React for a smooth, user-friendly interface.</a:t>
+              <a:t>Provide localized strings globally.</a:t>
             </a:r>
           </a:p>
           <a:p>
@@ -6808,440 +6949,20 @@
             <a:endParaRPr lang="en-GB" dirty="0"/>
           </a:p>
           <a:p>
-            <a:r>
-              <a:rPr lang="en-GB" b="1" dirty="0"/>
-              <a:t>Business Tools</a:t>
-            </a:r>
-            <a:r>
-              <a:rPr lang="en-GB" dirty="0"/>
-              <a:t>: </a:t>
-            </a:r>
-            <a:br>
-              <a:rPr lang="en-GB" dirty="0"/>
-            </a:br>
-            <a:r>
-              <a:rPr lang="en-GB" dirty="0"/>
-              <a:t>Used by companies like Slack and Salesforce to build responsive dashboards and data visualization tools.</a:t>
-            </a:r>
-          </a:p>
-        </p:txBody>
-      </p:sp>
-    </p:spTree>
-    <p:extLst>
-      <p:ext uri="{BB962C8B-B14F-4D97-AF65-F5344CB8AC3E}">
-        <p14:creationId xmlns:p14="http://schemas.microsoft.com/office/powerpoint/2010/main" val="801162467"/>
-      </p:ext>
-    </p:extLst>
-  </p:cSld>
-  <p:clrMapOvr>
-    <a:masterClrMapping/>
-  </p:clrMapOvr>
-</p:sld>
-</file>
-
-<file path=ppt/slides/slide6.xml><?xml version="1.0" encoding="utf-8"?>
-<p:sld xmlns:a="http://schemas.openxmlformats.org/drawingml/2006/main" xmlns:r="http://schemas.openxmlformats.org/officeDocument/2006/relationships" xmlns:p="http://schemas.openxmlformats.org/presentationml/2006/main">
-  <p:cSld>
-    <p:spTree>
-      <p:nvGrpSpPr>
-        <p:cNvPr id="1" name="">
-          <a:extLst>
-            <a:ext uri="{FF2B5EF4-FFF2-40B4-BE49-F238E27FC236}">
-              <a16:creationId xmlns:a16="http://schemas.microsoft.com/office/drawing/2014/main" id="{E083A2D5-79EF-6C4B-982A-B0D8EF3227C4}"/>
-            </a:ext>
-          </a:extLst>
-        </p:cNvPr>
-        <p:cNvGrpSpPr/>
-        <p:nvPr/>
-      </p:nvGrpSpPr>
-      <p:grpSpPr>
-        <a:xfrm>
-          <a:off x="0" y="0"/>
-          <a:ext cx="0" cy="0"/>
-          <a:chOff x="0" y="0"/>
-          <a:chExt cx="0" cy="0"/>
-        </a:xfrm>
-      </p:grpSpPr>
-      <p:sp>
-        <p:nvSpPr>
-          <p:cNvPr id="2" name="Title 1">
-            <a:extLst>
-              <a:ext uri="{FF2B5EF4-FFF2-40B4-BE49-F238E27FC236}">
-                <a16:creationId xmlns:a16="http://schemas.microsoft.com/office/drawing/2014/main" id="{FD5CCBB0-58ED-9772-C2E0-855EA4A029D9}"/>
-              </a:ext>
-            </a:extLst>
-          </p:cNvPr>
-          <p:cNvSpPr>
-            <a:spLocks noGrp="1"/>
-          </p:cNvSpPr>
-          <p:nvPr>
-            <p:ph type="title"/>
-          </p:nvPr>
-        </p:nvSpPr>
-        <p:spPr>
-          <a:xfrm>
-            <a:off x="581193" y="729658"/>
-            <a:ext cx="11029616" cy="988332"/>
-          </a:xfrm>
-        </p:spPr>
-        <p:txBody>
-          <a:bodyPr anchor="b">
-            <a:normAutofit/>
-          </a:bodyPr>
-          <a:lstStyle/>
-          <a:p>
-            <a:r>
-              <a:rPr lang="en-GB" b="1" dirty="0"/>
-              <a:t>Pros and Cons of React</a:t>
-            </a:r>
-            <a:endParaRPr lang="en-GB" dirty="0"/>
-          </a:p>
-        </p:txBody>
-      </p:sp>
-      <p:sp>
-        <p:nvSpPr>
-          <p:cNvPr id="3" name="Content Placeholder 2">
-            <a:extLst>
-              <a:ext uri="{FF2B5EF4-FFF2-40B4-BE49-F238E27FC236}">
-                <a16:creationId xmlns:a16="http://schemas.microsoft.com/office/drawing/2014/main" id="{8B328E33-DB28-2F65-94EE-1FCCDFB3B59D}"/>
-              </a:ext>
-            </a:extLst>
-          </p:cNvPr>
-          <p:cNvSpPr>
-            <a:spLocks noGrp="1"/>
-          </p:cNvSpPr>
-          <p:nvPr>
-            <p:ph sz="half" idx="1"/>
-          </p:nvPr>
-        </p:nvSpPr>
-        <p:spPr>
-          <a:xfrm>
-            <a:off x="581193" y="2190326"/>
-            <a:ext cx="5422390" cy="3633047"/>
-          </a:xfrm>
-        </p:spPr>
-        <p:txBody>
-          <a:bodyPr anchor="ctr">
-            <a:normAutofit/>
-          </a:bodyPr>
-          <a:lstStyle/>
-          <a:p>
-            <a:r>
-              <a:rPr lang="en-GB" b="1" dirty="0"/>
-              <a:t>Pros</a:t>
-            </a:r>
-            <a:r>
-              <a:rPr lang="en-GB" dirty="0"/>
-              <a:t>:</a:t>
-            </a:r>
-          </a:p>
-          <a:p>
             <a:pPr>
               <a:buFont typeface="Arial" panose="020B0604020202020204" pitchFamily="34" charset="0"/>
               <a:buChar char="•"/>
             </a:pPr>
             <a:r>
+              <a:rPr lang="en-GB" b="1" dirty="0"/>
+              <a:t>State Sharing:</a:t>
+            </a:r>
+            <a:br>
               <a:rPr lang="en-GB" dirty="0"/>
-              <a:t>Component Reusability</a:t>
-            </a:r>
-          </a:p>
-          <a:p>
-            <a:pPr>
-              <a:buFont typeface="Arial" panose="020B0604020202020204" pitchFamily="34" charset="0"/>
-              <a:buChar char="•"/>
-            </a:pPr>
+            </a:br>
             <a:r>
               <a:rPr lang="en-GB" dirty="0"/>
-              <a:t>Virtual DOM for better performance</a:t>
-            </a:r>
-          </a:p>
-          <a:p>
-            <a:pPr>
-              <a:buFont typeface="Arial" panose="020B0604020202020204" pitchFamily="34" charset="0"/>
-              <a:buChar char="•"/>
-            </a:pPr>
-            <a:r>
-              <a:rPr lang="en-GB" dirty="0"/>
-              <a:t>Strong ecosystem and community</a:t>
-            </a:r>
-          </a:p>
-          <a:p>
-            <a:pPr>
-              <a:buFont typeface="Arial" panose="020B0604020202020204" pitchFamily="34" charset="0"/>
-              <a:buChar char="•"/>
-            </a:pPr>
-            <a:r>
-              <a:rPr lang="en-GB" dirty="0"/>
-              <a:t>Easy integration with other libraries</a:t>
-            </a:r>
-          </a:p>
-        </p:txBody>
-      </p:sp>
-      <p:sp>
-        <p:nvSpPr>
-          <p:cNvPr id="4" name="Content Placeholder 2">
-            <a:extLst>
-              <a:ext uri="{FF2B5EF4-FFF2-40B4-BE49-F238E27FC236}">
-                <a16:creationId xmlns:a16="http://schemas.microsoft.com/office/drawing/2014/main" id="{46B2BAF1-04E0-9724-3D0F-94BB4E898FA6}"/>
-              </a:ext>
-            </a:extLst>
-          </p:cNvPr>
-          <p:cNvSpPr txBox="1">
-            <a:spLocks/>
-          </p:cNvSpPr>
-          <p:nvPr/>
-        </p:nvSpPr>
-        <p:spPr>
-          <a:xfrm>
-            <a:off x="5503556" y="2190326"/>
-            <a:ext cx="5422390" cy="3633047"/>
-          </a:xfrm>
-          <a:prstGeom prst="rect">
-            <a:avLst/>
-          </a:prstGeom>
-        </p:spPr>
-        <p:txBody>
-          <a:bodyPr vert="horz" lIns="91440" tIns="45720" rIns="91440" bIns="45720" rtlCol="0" anchor="ctr">
-            <a:normAutofit/>
-          </a:bodyPr>
-          <a:lstStyle>
-            <a:lvl1pPr marL="306000" indent="-306000" algn="l" defTabSz="457200" rtl="0" eaLnBrk="1" latinLnBrk="0" hangingPunct="1">
-              <a:spcBef>
-                <a:spcPct val="20000"/>
-              </a:spcBef>
-              <a:spcAft>
-                <a:spcPts val="600"/>
-              </a:spcAft>
-              <a:buClr>
-                <a:schemeClr val="accent2"/>
-              </a:buClr>
-              <a:buSzPct val="92000"/>
-              <a:buFont typeface="Wingdings 2" panose="05020102010507070707" pitchFamily="18" charset="2"/>
-              <a:buChar char=""/>
-              <a:defRPr sz="1800" kern="1200">
-                <a:solidFill>
-                  <a:schemeClr val="tx2"/>
-                </a:solidFill>
-                <a:latin typeface="+mn-lt"/>
-                <a:ea typeface="+mn-ea"/>
-                <a:cs typeface="+mn-cs"/>
-              </a:defRPr>
-            </a:lvl1pPr>
-            <a:lvl2pPr marL="630000" indent="-306000" algn="l" defTabSz="457200" rtl="0" eaLnBrk="1" latinLnBrk="0" hangingPunct="1">
-              <a:spcBef>
-                <a:spcPct val="20000"/>
-              </a:spcBef>
-              <a:spcAft>
-                <a:spcPts val="600"/>
-              </a:spcAft>
-              <a:buClr>
-                <a:schemeClr val="accent2"/>
-              </a:buClr>
-              <a:buSzPct val="92000"/>
-              <a:buFont typeface="Wingdings 2" panose="05020102010507070707" pitchFamily="18" charset="2"/>
-              <a:buChar char=""/>
-              <a:defRPr sz="1600" kern="1200">
-                <a:solidFill>
-                  <a:schemeClr val="tx2"/>
-                </a:solidFill>
-                <a:latin typeface="+mn-lt"/>
-                <a:ea typeface="+mn-ea"/>
-                <a:cs typeface="+mn-cs"/>
-              </a:defRPr>
-            </a:lvl2pPr>
-            <a:lvl3pPr marL="900000" indent="-270000" algn="l" defTabSz="457200" rtl="0" eaLnBrk="1" latinLnBrk="0" hangingPunct="1">
-              <a:spcBef>
-                <a:spcPct val="20000"/>
-              </a:spcBef>
-              <a:spcAft>
-                <a:spcPts val="600"/>
-              </a:spcAft>
-              <a:buClr>
-                <a:schemeClr val="accent2"/>
-              </a:buClr>
-              <a:buSzPct val="92000"/>
-              <a:buFont typeface="Wingdings 2" panose="05020102010507070707" pitchFamily="18" charset="2"/>
-              <a:buChar char=""/>
-              <a:defRPr sz="1400" kern="1200">
-                <a:solidFill>
-                  <a:schemeClr val="tx2"/>
-                </a:solidFill>
-                <a:latin typeface="+mn-lt"/>
-                <a:ea typeface="+mn-ea"/>
-                <a:cs typeface="+mn-cs"/>
-              </a:defRPr>
-            </a:lvl3pPr>
-            <a:lvl4pPr marL="1242000" indent="-234000" algn="l" defTabSz="457200" rtl="0" eaLnBrk="1" latinLnBrk="0" hangingPunct="1">
-              <a:spcBef>
-                <a:spcPct val="20000"/>
-              </a:spcBef>
-              <a:spcAft>
-                <a:spcPts val="600"/>
-              </a:spcAft>
-              <a:buClr>
-                <a:schemeClr val="accent2"/>
-              </a:buClr>
-              <a:buSzPct val="92000"/>
-              <a:buFont typeface="Wingdings 2" panose="05020102010507070707" pitchFamily="18" charset="2"/>
-              <a:buChar char=""/>
-              <a:defRPr sz="1200" kern="1200">
-                <a:solidFill>
-                  <a:schemeClr val="tx2"/>
-                </a:solidFill>
-                <a:latin typeface="+mn-lt"/>
-                <a:ea typeface="+mn-ea"/>
-                <a:cs typeface="+mn-cs"/>
-              </a:defRPr>
-            </a:lvl4pPr>
-            <a:lvl5pPr marL="1602000" indent="-234000" algn="l" defTabSz="457200" rtl="0" eaLnBrk="1" latinLnBrk="0" hangingPunct="1">
-              <a:spcBef>
-                <a:spcPct val="20000"/>
-              </a:spcBef>
-              <a:spcAft>
-                <a:spcPts val="600"/>
-              </a:spcAft>
-              <a:buClr>
-                <a:schemeClr val="accent2"/>
-              </a:buClr>
-              <a:buSzPct val="92000"/>
-              <a:buFont typeface="Wingdings 2" panose="05020102010507070707" pitchFamily="18" charset="2"/>
-              <a:buChar char=""/>
-              <a:defRPr sz="1200" kern="1200">
-                <a:solidFill>
-                  <a:schemeClr val="tx2"/>
-                </a:solidFill>
-                <a:latin typeface="+mn-lt"/>
-                <a:ea typeface="+mn-ea"/>
-                <a:cs typeface="+mn-cs"/>
-              </a:defRPr>
-            </a:lvl5pPr>
-            <a:lvl6pPr marL="1900000" indent="-228600" algn="l" defTabSz="457200" rtl="0" eaLnBrk="1" latinLnBrk="0" hangingPunct="1">
-              <a:spcBef>
-                <a:spcPct val="20000"/>
-              </a:spcBef>
-              <a:spcAft>
-                <a:spcPts val="600"/>
-              </a:spcAft>
-              <a:buClr>
-                <a:schemeClr val="accent2"/>
-              </a:buClr>
-              <a:buSzPct val="92000"/>
-              <a:buFont typeface="Wingdings 2" panose="05020102010507070707" pitchFamily="18" charset="2"/>
-              <a:buChar char=""/>
-              <a:defRPr sz="1200" kern="1200">
-                <a:solidFill>
-                  <a:schemeClr val="tx2"/>
-                </a:solidFill>
-                <a:latin typeface="+mn-lt"/>
-                <a:ea typeface="+mn-ea"/>
-                <a:cs typeface="+mn-cs"/>
-              </a:defRPr>
-            </a:lvl6pPr>
-            <a:lvl7pPr marL="2200000" indent="-228600" algn="l" defTabSz="457200" rtl="0" eaLnBrk="1" latinLnBrk="0" hangingPunct="1">
-              <a:spcBef>
-                <a:spcPct val="20000"/>
-              </a:spcBef>
-              <a:spcAft>
-                <a:spcPts val="600"/>
-              </a:spcAft>
-              <a:buClr>
-                <a:schemeClr val="accent2"/>
-              </a:buClr>
-              <a:buSzPct val="92000"/>
-              <a:buFont typeface="Wingdings 2" panose="05020102010507070707" pitchFamily="18" charset="2"/>
-              <a:buChar char=""/>
-              <a:defRPr sz="1200" kern="1200">
-                <a:solidFill>
-                  <a:schemeClr val="tx2"/>
-                </a:solidFill>
-                <a:latin typeface="+mn-lt"/>
-                <a:ea typeface="+mn-ea"/>
-                <a:cs typeface="+mn-cs"/>
-              </a:defRPr>
-            </a:lvl7pPr>
-            <a:lvl8pPr marL="2500000" indent="-228600" algn="l" defTabSz="457200" rtl="0" eaLnBrk="1" latinLnBrk="0" hangingPunct="1">
-              <a:spcBef>
-                <a:spcPct val="20000"/>
-              </a:spcBef>
-              <a:spcAft>
-                <a:spcPts val="600"/>
-              </a:spcAft>
-              <a:buClr>
-                <a:schemeClr val="accent2"/>
-              </a:buClr>
-              <a:buSzPct val="92000"/>
-              <a:buFont typeface="Wingdings 2" panose="05020102010507070707" pitchFamily="18" charset="2"/>
-              <a:buChar char=""/>
-              <a:defRPr sz="1200" kern="1200">
-                <a:solidFill>
-                  <a:schemeClr val="tx2"/>
-                </a:solidFill>
-                <a:latin typeface="+mn-lt"/>
-                <a:ea typeface="+mn-ea"/>
-                <a:cs typeface="+mn-cs"/>
-              </a:defRPr>
-            </a:lvl8pPr>
-            <a:lvl9pPr marL="2800000" indent="-228600" algn="l" defTabSz="457200" rtl="0" eaLnBrk="1" latinLnBrk="0" hangingPunct="1">
-              <a:spcBef>
-                <a:spcPct val="20000"/>
-              </a:spcBef>
-              <a:spcAft>
-                <a:spcPts val="600"/>
-              </a:spcAft>
-              <a:buClr>
-                <a:schemeClr val="accent2"/>
-              </a:buClr>
-              <a:buSzPct val="92000"/>
-              <a:buFont typeface="Wingdings 2" panose="05020102010507070707" pitchFamily="18" charset="2"/>
-              <a:buChar char=""/>
-              <a:defRPr sz="1200" kern="1200">
-                <a:solidFill>
-                  <a:schemeClr val="tx2"/>
-                </a:solidFill>
-                <a:latin typeface="+mn-lt"/>
-                <a:ea typeface="+mn-ea"/>
-                <a:cs typeface="+mn-cs"/>
-              </a:defRPr>
-            </a:lvl9pPr>
-          </a:lstStyle>
-          <a:p>
-            <a:r>
-              <a:rPr lang="en-GB" b="1" dirty="0"/>
-              <a:t>Cons</a:t>
-            </a:r>
-            <a:r>
-              <a:rPr lang="en-GB" dirty="0"/>
-              <a:t>:</a:t>
-            </a:r>
-          </a:p>
-          <a:p>
-            <a:pPr marL="742950" lvl="1" indent="-285750">
-              <a:buFont typeface="Arial" panose="020B0604020202020204" pitchFamily="34" charset="0"/>
-              <a:buChar char="•"/>
-            </a:pPr>
-            <a:r>
-              <a:rPr lang="en-GB" dirty="0"/>
-              <a:t>Learning Curve: JSX and component architecture take time to learn</a:t>
-            </a:r>
-          </a:p>
-          <a:p>
-            <a:pPr marL="742950" lvl="1" indent="-285750">
-              <a:buFont typeface="Arial" panose="020B0604020202020204" pitchFamily="34" charset="0"/>
-              <a:buChar char="•"/>
-            </a:pPr>
-            <a:r>
-              <a:rPr lang="en-GB" dirty="0"/>
-              <a:t>JSX Syntax: Can feel non-standard for HTML/CSS developers</a:t>
-            </a:r>
-          </a:p>
-          <a:p>
-            <a:pPr marL="742950" lvl="1" indent="-285750">
-              <a:buFont typeface="Arial" panose="020B0604020202020204" pitchFamily="34" charset="0"/>
-              <a:buChar char="•"/>
-            </a:pPr>
-            <a:r>
-              <a:rPr lang="en-GB" dirty="0"/>
-              <a:t>Frequent Updates: Requires developers to keep up with changes</a:t>
+              <a:t>Share app-wide settings or data, like cart items in an e-commerce app.</a:t>
             </a:r>
           </a:p>
         </p:txBody>
@@ -7311,12 +7032,8 @@
           <a:lstStyle/>
           <a:p>
             <a:r>
-              <a:rPr lang="en-GB" dirty="0" err="1"/>
-              <a:t>Vite</a:t>
-            </a:r>
-            <a:r>
               <a:rPr lang="en-GB" dirty="0"/>
-              <a:t> vs. Create React App (CRA)</a:t>
+              <a:t>Creating Providers</a:t>
             </a:r>
           </a:p>
         </p:txBody>
@@ -7345,105 +7062,68 @@
         </p:spPr>
         <p:txBody>
           <a:bodyPr anchor="ctr">
-            <a:normAutofit lnSpcReduction="10000"/>
+            <a:normAutofit/>
           </a:bodyPr>
           <a:lstStyle/>
           <a:p>
             <a:r>
               <a:rPr lang="en-GB" b="1" dirty="0"/>
-              <a:t>Create React App (CRA)</a:t>
-            </a:r>
-            <a:r>
-              <a:rPr lang="en-GB" dirty="0"/>
-              <a:t>:</a:t>
-            </a:r>
-          </a:p>
-          <a:p>
-            <a:pPr marL="742950" lvl="1" indent="-285750">
-              <a:buFont typeface="Arial" panose="020B0604020202020204" pitchFamily="34" charset="0"/>
-              <a:buChar char="•"/>
-            </a:pPr>
-            <a:r>
-              <a:rPr lang="en-GB" dirty="0"/>
-              <a:t>Traditional React setup tool.</a:t>
-            </a:r>
-          </a:p>
-          <a:p>
-            <a:pPr marL="742950" lvl="1" indent="-285750">
-              <a:buFont typeface="Arial" panose="020B0604020202020204" pitchFamily="34" charset="0"/>
-              <a:buChar char="•"/>
-            </a:pPr>
-            <a:r>
-              <a:rPr lang="en-GB" dirty="0"/>
-              <a:t>Easy to use but can be slow due to bundling.</a:t>
-            </a:r>
-          </a:p>
-          <a:p>
-            <a:r>
-              <a:rPr lang="en-GB" b="1" dirty="0" err="1"/>
-              <a:t>Vite</a:t>
-            </a:r>
-            <a:r>
-              <a:rPr lang="en-GB" dirty="0"/>
-              <a:t>:</a:t>
-            </a:r>
-          </a:p>
-          <a:p>
-            <a:pPr marL="742950" lvl="1" indent="-285750">
-              <a:buFont typeface="Arial" panose="020B0604020202020204" pitchFamily="34" charset="0"/>
-              <a:buChar char="•"/>
-            </a:pPr>
-            <a:r>
-              <a:rPr lang="en-GB" dirty="0"/>
-              <a:t>Modern development tool for fast builds and hot module replacement.</a:t>
-            </a:r>
-          </a:p>
-          <a:p>
-            <a:pPr marL="742950" lvl="1" indent="-285750">
-              <a:buFont typeface="Arial" panose="020B0604020202020204" pitchFamily="34" charset="0"/>
-              <a:buChar char="•"/>
-            </a:pPr>
-            <a:r>
-              <a:rPr lang="en-GB" dirty="0"/>
-              <a:t>Better suited for larger, complex applications.</a:t>
-            </a:r>
-          </a:p>
-          <a:p>
-            <a:pPr marL="457200" lvl="1" indent="0">
-              <a:buNone/>
-            </a:pPr>
-            <a:endParaRPr lang="en-GB" b="1" dirty="0"/>
-          </a:p>
-          <a:p>
-            <a:pPr marL="418950" indent="-285750"/>
-            <a:r>
-              <a:rPr lang="en-GB" b="1" dirty="0"/>
-              <a:t>Why </a:t>
-            </a:r>
-            <a:r>
-              <a:rPr lang="en-GB" b="1" dirty="0" err="1"/>
-              <a:t>Vite</a:t>
-            </a:r>
-            <a:r>
-              <a:rPr lang="en-GB" b="1" dirty="0"/>
-              <a:t>?</a:t>
+              <a:t>What is a Provider?</a:t>
             </a:r>
             <a:br>
               <a:rPr lang="en-GB" dirty="0"/>
             </a:br>
             <a:r>
               <a:rPr lang="en-GB" dirty="0"/>
-              <a:t>Faster initial load times and builds, supports modern JavaScript features.</a:t>
-            </a:r>
+              <a:t>A component that supplies the Context value to its children.</a:t>
+            </a:r>
+          </a:p>
+          <a:p>
+            <a:r>
+              <a:rPr lang="en-GB" b="1" dirty="0"/>
+              <a:t>Steps to Create a Provider:</a:t>
+            </a:r>
+            <a:endParaRPr lang="en-GB" dirty="0"/>
+          </a:p>
+          <a:p>
+            <a:pPr>
+              <a:buFont typeface="+mj-lt"/>
+              <a:buAutoNum type="arabicPeriod"/>
+            </a:pPr>
+            <a:r>
+              <a:rPr lang="en-GB" dirty="0"/>
+              <a:t>Create Context:</a:t>
+            </a:r>
+            <a:br>
+              <a:rPr lang="en-GB" dirty="0"/>
+            </a:br>
+            <a:br>
+              <a:rPr lang="en-GB" dirty="0"/>
+            </a:br>
+            <a:br>
+              <a:rPr lang="en-GB" dirty="0"/>
+            </a:br>
+            <a:br>
+              <a:rPr lang="en-GB" dirty="0"/>
+            </a:br>
+            <a:r>
+              <a:rPr lang="en-GB" dirty="0"/>
+              <a:t>Wrap components with </a:t>
+            </a:r>
+            <a:r>
+              <a:rPr lang="en-GB" dirty="0" err="1"/>
+              <a:t>MyContext.Provider</a:t>
+            </a:r>
+            <a:endParaRPr lang="en-GB" dirty="0"/>
           </a:p>
         </p:txBody>
       </p:sp>
       <p:pic>
         <p:nvPicPr>
-          <p:cNvPr id="4" name="Picture 3">
+          <p:cNvPr id="6" name="Picture 5">
             <a:extLst>
               <a:ext uri="{FF2B5EF4-FFF2-40B4-BE49-F238E27FC236}">
-                <a16:creationId xmlns:a16="http://schemas.microsoft.com/office/drawing/2014/main" id="{BF992DE8-D129-7E41-2128-EC659595C2EE}"/>
+                <a16:creationId xmlns:a16="http://schemas.microsoft.com/office/drawing/2014/main" id="{F602D2E9-1B17-E8B2-6107-27EA30714BC6}"/>
               </a:ext>
             </a:extLst>
           </p:cNvPr>
@@ -7460,8 +7140,38 @@
         </p:blipFill>
         <p:spPr>
           <a:xfrm>
-            <a:off x="7354024" y="2798283"/>
-            <a:ext cx="2923112" cy="2880911"/>
+            <a:off x="7726417" y="3661937"/>
+            <a:ext cx="3962400" cy="558800"/>
+          </a:xfrm>
+          <a:prstGeom prst="rect">
+            <a:avLst/>
+          </a:prstGeom>
+        </p:spPr>
+      </p:pic>
+      <p:pic>
+        <p:nvPicPr>
+          <p:cNvPr id="8" name="Picture 7" descr="A black background with white text&#10;&#10;Description automatically generated">
+            <a:extLst>
+              <a:ext uri="{FF2B5EF4-FFF2-40B4-BE49-F238E27FC236}">
+                <a16:creationId xmlns:a16="http://schemas.microsoft.com/office/drawing/2014/main" id="{AB8E3EB3-AB04-36EC-DDCC-0D3F55A06CDC}"/>
+              </a:ext>
+            </a:extLst>
+          </p:cNvPr>
+          <p:cNvPicPr>
+            <a:picLocks noChangeAspect="1"/>
+          </p:cNvPicPr>
+          <p:nvPr/>
+        </p:nvPicPr>
+        <p:blipFill>
+          <a:blip r:embed="rId3"/>
+          <a:stretch>
+            <a:fillRect/>
+          </a:stretch>
+        </p:blipFill>
+        <p:spPr>
+          <a:xfrm>
+            <a:off x="5821417" y="4730750"/>
+            <a:ext cx="5867400" cy="1130300"/>
           </a:xfrm>
           <a:prstGeom prst="rect">
             <a:avLst/>
@@ -7534,13 +7244,8 @@
           <a:p>
             <a:r>
               <a:rPr lang="en-GB" dirty="0"/>
-              <a:t>Creating a New App Using </a:t>
-            </a:r>
-            <a:r>
-              <a:rPr lang="en-GB" dirty="0" err="1"/>
-              <a:t>Vite</a:t>
-            </a:r>
-            <a:endParaRPr lang="en-GB" dirty="0"/>
+              <a:t>Using Providers</a:t>
+            </a:r>
           </a:p>
         </p:txBody>
       </p:sp>
@@ -7568,100 +7273,61 @@
         </p:spPr>
         <p:txBody>
           <a:bodyPr anchor="ctr">
-            <a:normAutofit lnSpcReduction="10000"/>
+            <a:normAutofit/>
           </a:bodyPr>
           <a:lstStyle/>
           <a:p>
             <a:r>
               <a:rPr lang="en-GB" b="1" dirty="0"/>
-              <a:t>Step 1</a:t>
-            </a:r>
+              <a:t>Access the provided value using hooks:</a:t>
+            </a:r>
+          </a:p>
+          <a:p>
+            <a:r>
+              <a:rPr lang="en-GB" b="1" dirty="0"/>
+              <a:t>Benefits:</a:t>
+            </a:r>
+            <a:endParaRPr lang="en-GB" dirty="0"/>
+          </a:p>
+          <a:p>
+            <a:pPr>
+              <a:buFont typeface="Arial" panose="020B0604020202020204" pitchFamily="34" charset="0"/>
+              <a:buChar char="•"/>
+            </a:pPr>
             <a:r>
               <a:rPr lang="en-GB" dirty="0"/>
-              <a:t>: </a:t>
-            </a:r>
-            <a:br>
+              <a:t>Cleaner syntax with </a:t>
+            </a:r>
+            <a:r>
+              <a:rPr lang="en-GB" dirty="0" err="1"/>
+              <a:t>useContext</a:t>
+            </a:r>
+            <a:r>
               <a:rPr lang="en-GB" dirty="0"/>
-            </a:br>
+              <a:t>.</a:t>
+            </a:r>
+          </a:p>
+          <a:p>
+            <a:pPr>
+              <a:buFont typeface="Arial" panose="020B0604020202020204" pitchFamily="34" charset="0"/>
+              <a:buChar char="•"/>
+            </a:pPr>
             <a:r>
               <a:rPr lang="en-GB" dirty="0"/>
-              <a:t>Install using </a:t>
-            </a:r>
-            <a:r>
-              <a:rPr lang="en-GB" dirty="0" err="1"/>
-              <a:t>Vite</a:t>
-            </a:r>
-            <a:r>
-              <a:rPr lang="en-GB" dirty="0"/>
-              <a:t>:</a:t>
-            </a:r>
-            <a:br>
-              <a:rPr lang="en-GB" dirty="0"/>
-            </a:br>
-            <a:br>
-              <a:rPr lang="en-GB" dirty="0"/>
-            </a:br>
+              <a:t>Avoids manually subscribing to updates.</a:t>
+            </a:r>
+          </a:p>
+          <a:p>
             <a:endParaRPr lang="en-GB" dirty="0"/>
-          </a:p>
-          <a:p>
-            <a:r>
-              <a:rPr lang="en-GB" b="1" dirty="0"/>
-              <a:t>Step 2</a:t>
-            </a:r>
-            <a:r>
-              <a:rPr lang="en-GB" dirty="0"/>
-              <a:t>: </a:t>
-            </a:r>
-            <a:br>
-              <a:rPr lang="en-GB" dirty="0"/>
-            </a:br>
-            <a:r>
-              <a:rPr lang="en-GB" dirty="0"/>
-              <a:t>Navigate to the new project:</a:t>
-            </a:r>
-            <a:br>
-              <a:rPr lang="en-GB" dirty="0"/>
-            </a:br>
-            <a:br>
-              <a:rPr lang="en-GB" dirty="0"/>
-            </a:br>
-            <a:endParaRPr lang="en-GB" dirty="0"/>
-          </a:p>
-          <a:p>
-            <a:r>
-              <a:rPr lang="en-GB" b="1" dirty="0"/>
-              <a:t>Step 3</a:t>
-            </a:r>
-            <a:r>
-              <a:rPr lang="en-GB" dirty="0"/>
-              <a:t>: </a:t>
-            </a:r>
-            <a:br>
-              <a:rPr lang="en-GB" dirty="0"/>
-            </a:br>
-            <a:r>
-              <a:rPr lang="en-GB" dirty="0"/>
-              <a:t>Install dependencies and start the server</a:t>
-            </a:r>
-            <a:br>
-              <a:rPr lang="en-GB" dirty="0"/>
-            </a:br>
-            <a:br>
-              <a:rPr lang="en-GB" dirty="0"/>
-            </a:br>
-            <a:r>
-              <a:rPr lang="en-GB" dirty="0"/>
-              <a:t>demo…</a:t>
-            </a:r>
           </a:p>
         </p:txBody>
       </p:sp>
       <p:pic>
         <p:nvPicPr>
-          <p:cNvPr id="6" name="Picture 5">
+          <p:cNvPr id="5" name="Picture 4" descr="A computer code with many colorful text&#10;&#10;Description automatically generated with medium confidence">
             <a:extLst>
               <a:ext uri="{FF2B5EF4-FFF2-40B4-BE49-F238E27FC236}">
-                <a16:creationId xmlns:a16="http://schemas.microsoft.com/office/drawing/2014/main" id="{10C46F92-95BC-F604-83D6-C9D36675A4A9}"/>
+                <a16:creationId xmlns:a16="http://schemas.microsoft.com/office/drawing/2014/main" id="{B2A63B7C-97A4-6981-E7FA-94F015260A3F}"/>
               </a:ext>
             </a:extLst>
           </p:cNvPr>
@@ -7678,68 +7344,8 @@
         </p:blipFill>
         <p:spPr>
           <a:xfrm>
-            <a:off x="7221950" y="2440580"/>
-            <a:ext cx="3962400" cy="533400"/>
-          </a:xfrm>
-          <a:prstGeom prst="rect">
-            <a:avLst/>
-          </a:prstGeom>
-        </p:spPr>
-      </p:pic>
-      <p:pic>
-        <p:nvPicPr>
-          <p:cNvPr id="8" name="Picture 7">
-            <a:extLst>
-              <a:ext uri="{FF2B5EF4-FFF2-40B4-BE49-F238E27FC236}">
-                <a16:creationId xmlns:a16="http://schemas.microsoft.com/office/drawing/2014/main" id="{59BE8D89-3411-A6AB-EDD9-A742FC23615F}"/>
-              </a:ext>
-            </a:extLst>
-          </p:cNvPr>
-          <p:cNvPicPr>
-            <a:picLocks noChangeAspect="1"/>
-          </p:cNvPicPr>
-          <p:nvPr/>
-        </p:nvPicPr>
-        <p:blipFill>
-          <a:blip r:embed="rId3"/>
-          <a:stretch>
-            <a:fillRect/>
-          </a:stretch>
-        </p:blipFill>
-        <p:spPr>
-          <a:xfrm>
-            <a:off x="7221950" y="3614675"/>
-            <a:ext cx="2032000" cy="508000"/>
-          </a:xfrm>
-          <a:prstGeom prst="rect">
-            <a:avLst/>
-          </a:prstGeom>
-        </p:spPr>
-      </p:pic>
-      <p:pic>
-        <p:nvPicPr>
-          <p:cNvPr id="10" name="Picture 9" descr="A black background with white text&#10;&#10;Description automatically generated">
-            <a:extLst>
-              <a:ext uri="{FF2B5EF4-FFF2-40B4-BE49-F238E27FC236}">
-                <a16:creationId xmlns:a16="http://schemas.microsoft.com/office/drawing/2014/main" id="{D9C1CDD1-6496-672B-4FCB-60F048238E71}"/>
-              </a:ext>
-            </a:extLst>
-          </p:cNvPr>
-          <p:cNvPicPr>
-            <a:picLocks noChangeAspect="1"/>
-          </p:cNvPicPr>
-          <p:nvPr/>
-        </p:nvPicPr>
-        <p:blipFill>
-          <a:blip r:embed="rId4"/>
-          <a:stretch>
-            <a:fillRect/>
-          </a:stretch>
-        </p:blipFill>
-        <p:spPr>
-          <a:xfrm>
-            <a:off x="7221950" y="4763370"/>
-            <a:ext cx="1714500" cy="838200"/>
+            <a:off x="6549695" y="2748546"/>
+            <a:ext cx="5218132" cy="2806263"/>
           </a:xfrm>
           <a:prstGeom prst="rect">
             <a:avLst/>
@@ -7812,7 +7418,7 @@
           <a:p>
             <a:r>
               <a:rPr lang="en-GB" dirty="0"/>
-              <a:t>Basic JSX Expressions</a:t>
+              <a:t>Use of Multiple Contexts/Providers</a:t>
             </a:r>
           </a:p>
         </p:txBody>
@@ -7847,72 +7453,66 @@
           <a:p>
             <a:r>
               <a:rPr lang="en-GB" b="1" dirty="0"/>
-              <a:t>What is JSX?</a:t>
-            </a:r>
+              <a:t>Why Use Multiple Contexts?</a:t>
+            </a:r>
+            <a:endParaRPr lang="en-GB" dirty="0"/>
+          </a:p>
+          <a:p>
+            <a:pPr>
+              <a:buFont typeface="Arial" panose="020B0604020202020204" pitchFamily="34" charset="0"/>
+              <a:buChar char="•"/>
+            </a:pPr>
             <a:r>
               <a:rPr lang="en-GB" dirty="0"/>
-              <a:t>: </a:t>
+              <a:t>Separate concerns, e.g., </a:t>
+            </a:r>
+            <a:r>
+              <a:rPr lang="en-GB" dirty="0" err="1"/>
+              <a:t>UserContext</a:t>
+            </a:r>
+            <a:r>
+              <a:rPr lang="en-GB" dirty="0"/>
+              <a:t> for user info and </a:t>
+            </a:r>
+            <a:r>
+              <a:rPr lang="en-GB" dirty="0" err="1"/>
+              <a:t>ThemeContext</a:t>
+            </a:r>
+            <a:r>
+              <a:rPr lang="en-GB" dirty="0"/>
+              <a:t> for themes.</a:t>
+            </a:r>
+          </a:p>
+          <a:p>
+            <a:r>
+              <a:rPr lang="en-GB" b="1" dirty="0"/>
+              <a:t>Implementation Example:</a:t>
             </a:r>
             <a:br>
-              <a:rPr lang="en-GB" dirty="0"/>
-            </a:br>
-            <a:r>
-              <a:rPr lang="en-GB" dirty="0"/>
-              <a:t>JavaScript syntax extension that looks similar to HTML.</a:t>
-            </a:r>
-          </a:p>
-          <a:p>
-            <a:r>
               <a:rPr lang="en-GB" b="1" dirty="0"/>
-              <a:t>Embedding JavaScript</a:t>
-            </a:r>
-            <a:r>
-              <a:rPr lang="en-GB" dirty="0"/>
-              <a:t>: </a:t>
-            </a:r>
-            <a:br>
-              <a:rPr lang="en-GB" dirty="0"/>
-            </a:br>
-            <a:r>
-              <a:rPr lang="en-GB" dirty="0"/>
-              <a:t>Use {} to embed JavaScript expressions within JSX.</a:t>
-            </a:r>
-          </a:p>
-          <a:p>
-            <a:r>
-              <a:rPr lang="en-GB" b="1" dirty="0"/>
-              <a:t>Key Concept</a:t>
-            </a:r>
-            <a:r>
-              <a:rPr lang="en-GB" dirty="0"/>
-              <a:t>:</a:t>
-            </a:r>
-            <a:br>
-              <a:rPr lang="en-GB" dirty="0"/>
-            </a:br>
-            <a:r>
-              <a:rPr lang="en-GB" dirty="0"/>
-              <a:t> JSX makes code more readable and allows embedding logic directly in UI definitions.</a:t>
-            </a:r>
-            <a:br>
-              <a:rPr lang="en-GB" dirty="0"/>
             </a:br>
             <a:br>
+              <a:rPr lang="en-GB" b="1" dirty="0"/>
+            </a:br>
+            <a:br>
+              <a:rPr lang="en-GB" b="1" dirty="0"/>
+            </a:br>
+            <a:br>
+              <a:rPr lang="en-GB" b="1" dirty="0"/>
+            </a:br>
+            <a:r>
               <a:rPr lang="en-GB" dirty="0"/>
-            </a:br>
-            <a:r>
-              <a:rPr lang="en-GB" dirty="0"/>
-              <a:t>Demo…</a:t>
+              <a:t>Access values separately in components:</a:t>
             </a:r>
           </a:p>
         </p:txBody>
       </p:sp>
       <p:pic>
         <p:nvPicPr>
-          <p:cNvPr id="5" name="Picture 4" descr="A black background with white text&#10;&#10;Description automatically generated">
+          <p:cNvPr id="6" name="Picture 5" descr="A black screen with white text&#10;&#10;Description automatically generated">
             <a:extLst>
               <a:ext uri="{FF2B5EF4-FFF2-40B4-BE49-F238E27FC236}">
-                <a16:creationId xmlns:a16="http://schemas.microsoft.com/office/drawing/2014/main" id="{EDDADB95-498F-FF3E-1952-F759B3C5B498}"/>
+                <a16:creationId xmlns:a16="http://schemas.microsoft.com/office/drawing/2014/main" id="{656366BF-7F8A-893A-1F3E-C8AE001DF536}"/>
               </a:ext>
             </a:extLst>
           </p:cNvPr>
@@ -7929,8 +7529,38 @@
         </p:blipFill>
         <p:spPr>
           <a:xfrm>
-            <a:off x="6545632" y="3429000"/>
-            <a:ext cx="4762500" cy="749300"/>
+            <a:off x="7115007" y="2799926"/>
+            <a:ext cx="4559300" cy="1803400"/>
+          </a:xfrm>
+          <a:prstGeom prst="rect">
+            <a:avLst/>
+          </a:prstGeom>
+        </p:spPr>
+      </p:pic>
+      <p:pic>
+        <p:nvPicPr>
+          <p:cNvPr id="8" name="Picture 7" descr="Red text on a black background&#10;&#10;Description automatically generated">
+            <a:extLst>
+              <a:ext uri="{FF2B5EF4-FFF2-40B4-BE49-F238E27FC236}">
+                <a16:creationId xmlns:a16="http://schemas.microsoft.com/office/drawing/2014/main" id="{7FE91AAE-9A75-C3DB-79E3-0E0646ED0DC3}"/>
+              </a:ext>
+            </a:extLst>
+          </p:cNvPr>
+          <p:cNvPicPr>
+            <a:picLocks noChangeAspect="1"/>
+          </p:cNvPicPr>
+          <p:nvPr/>
+        </p:nvPicPr>
+        <p:blipFill>
+          <a:blip r:embed="rId3"/>
+          <a:stretch>
+            <a:fillRect/>
+          </a:stretch>
+        </p:blipFill>
+        <p:spPr>
+          <a:xfrm>
+            <a:off x="7115007" y="5302842"/>
+            <a:ext cx="4495800" cy="825500"/>
           </a:xfrm>
           <a:prstGeom prst="rect">
             <a:avLst/>

</xml_diff>